<commit_message>
Updates to Persistency materials
Updates to Persistency materials
</commit_message>
<xml_diff>
--- a/Chap/Persist/Presentations/PersistencyDatabaseEF.pptx
+++ b/Chap/Persist/Presentations/PersistencyDatabaseEF.pptx
@@ -15,8 +15,8 @@
     <p:sldId id="384" r:id="rId9"/>
     <p:sldId id="385" r:id="rId10"/>
     <p:sldId id="386" r:id="rId11"/>
-    <p:sldId id="387" r:id="rId12"/>
-    <p:sldId id="388" r:id="rId13"/>
+    <p:sldId id="388" r:id="rId12"/>
+    <p:sldId id="398" r:id="rId13"/>
     <p:sldId id="369" r:id="rId14"/>
     <p:sldId id="389" r:id="rId15"/>
     <p:sldId id="390" r:id="rId16"/>
@@ -264,7 +264,7 @@
           <a:p>
             <a:fld id="{E15B7D8E-2A20-4C0E-991C-872DBB7459A8}" type="datetimeFigureOut">
               <a:rPr lang="da-DK" smtClean="0"/>
-              <a:t>27-02-2018</a:t>
+              <a:t>25-10-2018</a:t>
             </a:fld>
             <a:endParaRPr lang="da-DK"/>
           </a:p>
@@ -434,7 +434,7 @@
           <a:p>
             <a:fld id="{E15B7D8E-2A20-4C0E-991C-872DBB7459A8}" type="datetimeFigureOut">
               <a:rPr lang="da-DK" smtClean="0"/>
-              <a:t>27-02-2018</a:t>
+              <a:t>25-10-2018</a:t>
             </a:fld>
             <a:endParaRPr lang="da-DK"/>
           </a:p>
@@ -614,7 +614,7 @@
           <a:p>
             <a:fld id="{E15B7D8E-2A20-4C0E-991C-872DBB7459A8}" type="datetimeFigureOut">
               <a:rPr lang="da-DK" smtClean="0"/>
-              <a:t>27-02-2018</a:t>
+              <a:t>25-10-2018</a:t>
             </a:fld>
             <a:endParaRPr lang="da-DK"/>
           </a:p>
@@ -784,7 +784,7 @@
           <a:p>
             <a:fld id="{E15B7D8E-2A20-4C0E-991C-872DBB7459A8}" type="datetimeFigureOut">
               <a:rPr lang="da-DK" smtClean="0"/>
-              <a:t>27-02-2018</a:t>
+              <a:t>25-10-2018</a:t>
             </a:fld>
             <a:endParaRPr lang="da-DK"/>
           </a:p>
@@ -1030,7 +1030,7 @@
           <a:p>
             <a:fld id="{E15B7D8E-2A20-4C0E-991C-872DBB7459A8}" type="datetimeFigureOut">
               <a:rPr lang="da-DK" smtClean="0"/>
-              <a:t>27-02-2018</a:t>
+              <a:t>25-10-2018</a:t>
             </a:fld>
             <a:endParaRPr lang="da-DK"/>
           </a:p>
@@ -1262,7 +1262,7 @@
           <a:p>
             <a:fld id="{E15B7D8E-2A20-4C0E-991C-872DBB7459A8}" type="datetimeFigureOut">
               <a:rPr lang="da-DK" smtClean="0"/>
-              <a:t>27-02-2018</a:t>
+              <a:t>25-10-2018</a:t>
             </a:fld>
             <a:endParaRPr lang="da-DK"/>
           </a:p>
@@ -1629,7 +1629,7 @@
           <a:p>
             <a:fld id="{E15B7D8E-2A20-4C0E-991C-872DBB7459A8}" type="datetimeFigureOut">
               <a:rPr lang="da-DK" smtClean="0"/>
-              <a:t>27-02-2018</a:t>
+              <a:t>25-10-2018</a:t>
             </a:fld>
             <a:endParaRPr lang="da-DK"/>
           </a:p>
@@ -1747,7 +1747,7 @@
           <a:p>
             <a:fld id="{E15B7D8E-2A20-4C0E-991C-872DBB7459A8}" type="datetimeFigureOut">
               <a:rPr lang="da-DK" smtClean="0"/>
-              <a:t>27-02-2018</a:t>
+              <a:t>25-10-2018</a:t>
             </a:fld>
             <a:endParaRPr lang="da-DK"/>
           </a:p>
@@ -1842,7 +1842,7 @@
           <a:p>
             <a:fld id="{E15B7D8E-2A20-4C0E-991C-872DBB7459A8}" type="datetimeFigureOut">
               <a:rPr lang="da-DK" smtClean="0"/>
-              <a:t>27-02-2018</a:t>
+              <a:t>25-10-2018</a:t>
             </a:fld>
             <a:endParaRPr lang="da-DK"/>
           </a:p>
@@ -2119,7 +2119,7 @@
           <a:p>
             <a:fld id="{E15B7D8E-2A20-4C0E-991C-872DBB7459A8}" type="datetimeFigureOut">
               <a:rPr lang="da-DK" smtClean="0"/>
-              <a:t>27-02-2018</a:t>
+              <a:t>25-10-2018</a:t>
             </a:fld>
             <a:endParaRPr lang="da-DK"/>
           </a:p>
@@ -2372,7 +2372,7 @@
           <a:p>
             <a:fld id="{E15B7D8E-2A20-4C0E-991C-872DBB7459A8}" type="datetimeFigureOut">
               <a:rPr lang="da-DK" smtClean="0"/>
-              <a:t>27-02-2018</a:t>
+              <a:t>25-10-2018</a:t>
             </a:fld>
             <a:endParaRPr lang="da-DK"/>
           </a:p>
@@ -2585,7 +2585,7 @@
           <a:p>
             <a:fld id="{E15B7D8E-2A20-4C0E-991C-872DBB7459A8}" type="datetimeFigureOut">
               <a:rPr lang="da-DK" smtClean="0"/>
-              <a:t>27-02-2018</a:t>
+              <a:t>25-10-2018</a:t>
             </a:fld>
             <a:endParaRPr lang="da-DK"/>
           </a:p>
@@ -3077,7 +3077,7 @@
       </p:grpSpPr>
       <p:pic>
         <p:nvPicPr>
-          <p:cNvPr id="4" name="Billede 3"/>
+          <p:cNvPr id="3" name="Billede 2"/>
           <p:cNvPicPr/>
           <p:nvPr/>
         </p:nvPicPr>
@@ -3089,8 +3089,8 @@
         </p:blipFill>
         <p:spPr>
           <a:xfrm>
-            <a:off x="1576136" y="607595"/>
-            <a:ext cx="8722895" cy="5041231"/>
+            <a:off x="1779202" y="1050757"/>
+            <a:ext cx="7467065" cy="4050631"/>
           </a:xfrm>
           <a:prstGeom prst="rect">
             <a:avLst/>
@@ -3136,7 +3136,7 @@
       </p:grpSpPr>
       <p:pic>
         <p:nvPicPr>
-          <p:cNvPr id="3" name="Billede 2"/>
+          <p:cNvPr id="14" name="Billede 13"/>
           <p:cNvPicPr/>
           <p:nvPr/>
         </p:nvPicPr>
@@ -3148,8 +3148,130 @@
         </p:blipFill>
         <p:spPr>
           <a:xfrm>
-            <a:off x="1380874" y="762667"/>
-            <a:ext cx="9357310" cy="5048585"/>
+            <a:off x="6736165" y="776036"/>
+            <a:ext cx="3508724" cy="4644190"/>
+          </a:xfrm>
+          <a:prstGeom prst="rect">
+            <a:avLst/>
+          </a:prstGeom>
+        </p:spPr>
+      </p:pic>
+      <p:sp>
+        <p:nvSpPr>
+          <p:cNvPr id="8" name="Højrepil 7"/>
+          <p:cNvSpPr/>
+          <p:nvPr/>
+        </p:nvSpPr>
+        <p:spPr>
+          <a:xfrm>
+            <a:off x="5001077" y="2816363"/>
+            <a:ext cx="956600" cy="563536"/>
+          </a:xfrm>
+          <a:prstGeom prst="rightArrow">
+            <a:avLst/>
+          </a:prstGeom>
+          <a:solidFill>
+            <a:schemeClr val="tx1">
+              <a:lumMod val="65000"/>
+              <a:lumOff val="35000"/>
+            </a:schemeClr>
+          </a:solidFill>
+        </p:spPr>
+        <p:style>
+          <a:lnRef idx="2">
+            <a:schemeClr val="accent1">
+              <a:shade val="50000"/>
+            </a:schemeClr>
+          </a:lnRef>
+          <a:fillRef idx="1">
+            <a:schemeClr val="accent1"/>
+          </a:fillRef>
+          <a:effectRef idx="0">
+            <a:schemeClr val="accent1"/>
+          </a:effectRef>
+          <a:fontRef idx="minor">
+            <a:schemeClr val="lt1"/>
+          </a:fontRef>
+        </p:style>
+        <p:txBody>
+          <a:bodyPr rtlCol="0" anchor="ctr"/>
+          <a:lstStyle/>
+          <a:p>
+            <a:pPr algn="ctr"/>
+            <a:endParaRPr lang="da-DK" sz="2800">
+              <a:solidFill>
+                <a:srgbClr val="FFFF00"/>
+              </a:solidFill>
+            </a:endParaRPr>
+          </a:p>
+        </p:txBody>
+      </p:sp>
+      <p:sp>
+        <p:nvSpPr>
+          <p:cNvPr id="9" name="Højrepil 8"/>
+          <p:cNvSpPr/>
+          <p:nvPr/>
+        </p:nvSpPr>
+        <p:spPr>
+          <a:xfrm>
+            <a:off x="10859374" y="2816363"/>
+            <a:ext cx="956600" cy="563536"/>
+          </a:xfrm>
+          <a:prstGeom prst="rightArrow">
+            <a:avLst/>
+          </a:prstGeom>
+          <a:solidFill>
+            <a:schemeClr val="tx1">
+              <a:lumMod val="65000"/>
+              <a:lumOff val="35000"/>
+            </a:schemeClr>
+          </a:solidFill>
+        </p:spPr>
+        <p:style>
+          <a:lnRef idx="2">
+            <a:schemeClr val="accent1">
+              <a:shade val="50000"/>
+            </a:schemeClr>
+          </a:lnRef>
+          <a:fillRef idx="1">
+            <a:schemeClr val="accent1"/>
+          </a:fillRef>
+          <a:effectRef idx="0">
+            <a:schemeClr val="accent1"/>
+          </a:effectRef>
+          <a:fontRef idx="minor">
+            <a:schemeClr val="lt1"/>
+          </a:fontRef>
+        </p:style>
+        <p:txBody>
+          <a:bodyPr rtlCol="0" anchor="ctr"/>
+          <a:lstStyle/>
+          <a:p>
+            <a:pPr algn="ctr"/>
+            <a:endParaRPr lang="da-DK" sz="2800">
+              <a:solidFill>
+                <a:srgbClr val="FFFF00"/>
+              </a:solidFill>
+            </a:endParaRPr>
+          </a:p>
+        </p:txBody>
+      </p:sp>
+      <p:pic>
+        <p:nvPicPr>
+          <p:cNvPr id="13" name="Billede 12"/>
+          <p:cNvPicPr/>
+          <p:nvPr/>
+        </p:nvPicPr>
+        <p:blipFill>
+          <a:blip r:embed="rId3"/>
+          <a:stretch>
+            <a:fillRect/>
+          </a:stretch>
+        </p:blipFill>
+        <p:spPr>
+          <a:xfrm>
+            <a:off x="379009" y="2065454"/>
+            <a:ext cx="3843581" cy="2578736"/>
           </a:xfrm>
           <a:prstGeom prst="rect">
             <a:avLst/>
@@ -3159,7 +3281,7 @@
     </p:spTree>
     <p:extLst>
       <p:ext uri="{BB962C8B-B14F-4D97-AF65-F5344CB8AC3E}">
-        <p14:creationId xmlns:p14="http://schemas.microsoft.com/office/powerpoint/2010/main" val="3241323678"/>
+        <p14:creationId xmlns:p14="http://schemas.microsoft.com/office/powerpoint/2010/main" val="3537013757"/>
       </p:ext>
     </p:extLst>
   </p:cSld>
@@ -3195,7 +3317,7 @@
       </p:grpSpPr>
       <p:pic>
         <p:nvPicPr>
-          <p:cNvPr id="4" name="Billede 3"/>
+          <p:cNvPr id="15" name="Billede 14"/>
           <p:cNvPicPr/>
           <p:nvPr/>
         </p:nvPicPr>
@@ -3207,89 +3329,23 @@
         </p:blipFill>
         <p:spPr>
           <a:xfrm>
-            <a:off x="361455" y="284997"/>
-            <a:ext cx="3531235" cy="3171825"/>
+            <a:off x="2043537" y="1570683"/>
+            <a:ext cx="3569193" cy="3848318"/>
           </a:xfrm>
           <a:prstGeom prst="rect">
             <a:avLst/>
           </a:prstGeom>
         </p:spPr>
       </p:pic>
-      <p:pic>
-        <p:nvPicPr>
-          <p:cNvPr id="5" name="Billede 4"/>
-          <p:cNvPicPr/>
+      <p:sp>
+        <p:nvSpPr>
+          <p:cNvPr id="10" name="Højrepil 9"/>
+          <p:cNvSpPr/>
           <p:nvPr/>
-        </p:nvPicPr>
-        <p:blipFill>
-          <a:blip r:embed="rId3"/>
-          <a:stretch>
-            <a:fillRect/>
-          </a:stretch>
-        </p:blipFill>
+        </p:nvSpPr>
         <p:spPr>
           <a:xfrm>
-            <a:off x="5576792" y="284996"/>
-            <a:ext cx="3514257" cy="3171825"/>
-          </a:xfrm>
-          <a:prstGeom prst="rect">
-            <a:avLst/>
-          </a:prstGeom>
-        </p:spPr>
-      </p:pic>
-      <p:pic>
-        <p:nvPicPr>
-          <p:cNvPr id="6" name="Billede 5"/>
-          <p:cNvPicPr/>
-          <p:nvPr/>
-        </p:nvPicPr>
-        <p:blipFill>
-          <a:blip r:embed="rId4"/>
-          <a:stretch>
-            <a:fillRect/>
-          </a:stretch>
-        </p:blipFill>
-        <p:spPr>
-          <a:xfrm>
-            <a:off x="361455" y="3807994"/>
-            <a:ext cx="2461327" cy="2658478"/>
-          </a:xfrm>
-          <a:prstGeom prst="rect">
-            <a:avLst/>
-          </a:prstGeom>
-        </p:spPr>
-      </p:pic>
-      <p:pic>
-        <p:nvPicPr>
-          <p:cNvPr id="7" name="Billede 6"/>
-          <p:cNvPicPr/>
-          <p:nvPr/>
-        </p:nvPicPr>
-        <p:blipFill>
-          <a:blip r:embed="rId5"/>
-          <a:stretch>
-            <a:fillRect/>
-          </a:stretch>
-        </p:blipFill>
-        <p:spPr>
-          <a:xfrm>
-            <a:off x="4125404" y="3807994"/>
-            <a:ext cx="2942741" cy="2658478"/>
-          </a:xfrm>
-          <a:prstGeom prst="rect">
-            <a:avLst/>
-          </a:prstGeom>
-        </p:spPr>
-      </p:pic>
-      <p:sp>
-        <p:nvSpPr>
-          <p:cNvPr id="8" name="Højrepil 7"/>
-          <p:cNvSpPr/>
-          <p:nvPr/>
-        </p:nvSpPr>
-        <p:spPr>
-          <a:xfrm>
-            <a:off x="4315256" y="1589141"/>
+            <a:off x="595493" y="3092839"/>
             <a:ext cx="956600" cy="563536"/>
           </a:xfrm>
           <a:prstGeom prst="rightArrow">
@@ -3333,13 +3389,13 @@
       </p:sp>
       <p:sp>
         <p:nvSpPr>
-          <p:cNvPr id="9" name="Højrepil 8"/>
+          <p:cNvPr id="12" name="Højrepil 11"/>
           <p:cNvSpPr/>
           <p:nvPr/>
         </p:nvSpPr>
         <p:spPr>
           <a:xfrm>
-            <a:off x="9499805" y="1589141"/>
+            <a:off x="6208967" y="3092839"/>
             <a:ext cx="956600" cy="563536"/>
           </a:xfrm>
           <a:prstGeom prst="rightArrow">
@@ -3381,132 +3437,32 @@
           </a:p>
         </p:txBody>
       </p:sp>
-      <p:sp>
-        <p:nvSpPr>
-          <p:cNvPr id="10" name="Højrepil 9"/>
-          <p:cNvSpPr/>
-          <p:nvPr/>
-        </p:nvSpPr>
-        <p:spPr>
-          <a:xfrm>
-            <a:off x="2995793" y="4933671"/>
-            <a:ext cx="956600" cy="563536"/>
-          </a:xfrm>
-          <a:prstGeom prst="rightArrow">
-            <a:avLst/>
-          </a:prstGeom>
-          <a:solidFill>
-            <a:schemeClr val="tx1">
-              <a:lumMod val="65000"/>
-              <a:lumOff val="35000"/>
-            </a:schemeClr>
-          </a:solidFill>
-        </p:spPr>
-        <p:style>
-          <a:lnRef idx="2">
-            <a:schemeClr val="accent1">
-              <a:shade val="50000"/>
-            </a:schemeClr>
-          </a:lnRef>
-          <a:fillRef idx="1">
-            <a:schemeClr val="accent1"/>
-          </a:fillRef>
-          <a:effectRef idx="0">
-            <a:schemeClr val="accent1"/>
-          </a:effectRef>
-          <a:fontRef idx="minor">
-            <a:schemeClr val="lt1"/>
-          </a:fontRef>
-        </p:style>
-        <p:txBody>
-          <a:bodyPr rtlCol="0" anchor="ctr"/>
-          <a:lstStyle/>
-          <a:p>
-            <a:pPr algn="ctr"/>
-            <a:endParaRPr lang="da-DK" sz="2800">
-              <a:solidFill>
-                <a:srgbClr val="FFFF00"/>
-              </a:solidFill>
-            </a:endParaRPr>
-          </a:p>
-        </p:txBody>
-      </p:sp>
       <p:pic>
         <p:nvPicPr>
-          <p:cNvPr id="11" name="Billede 10"/>
+          <p:cNvPr id="16" name="Billede 15"/>
           <p:cNvPicPr/>
           <p:nvPr/>
         </p:nvPicPr>
         <p:blipFill>
-          <a:blip r:embed="rId6"/>
+          <a:blip r:embed="rId3"/>
           <a:stretch>
             <a:fillRect/>
           </a:stretch>
         </p:blipFill>
         <p:spPr>
           <a:xfrm>
-            <a:off x="8370767" y="3807994"/>
-            <a:ext cx="2832958" cy="2658478"/>
+            <a:off x="7609973" y="1287379"/>
+            <a:ext cx="3617551" cy="4414523"/>
           </a:xfrm>
           <a:prstGeom prst="rect">
             <a:avLst/>
           </a:prstGeom>
         </p:spPr>
       </p:pic>
-      <p:sp>
-        <p:nvSpPr>
-          <p:cNvPr id="12" name="Højrepil 11"/>
-          <p:cNvSpPr/>
-          <p:nvPr/>
-        </p:nvSpPr>
-        <p:spPr>
-          <a:xfrm>
-            <a:off x="7333920" y="4855465"/>
-            <a:ext cx="956600" cy="563536"/>
-          </a:xfrm>
-          <a:prstGeom prst="rightArrow">
-            <a:avLst/>
-          </a:prstGeom>
-          <a:solidFill>
-            <a:schemeClr val="tx1">
-              <a:lumMod val="65000"/>
-              <a:lumOff val="35000"/>
-            </a:schemeClr>
-          </a:solidFill>
-        </p:spPr>
-        <p:style>
-          <a:lnRef idx="2">
-            <a:schemeClr val="accent1">
-              <a:shade val="50000"/>
-            </a:schemeClr>
-          </a:lnRef>
-          <a:fillRef idx="1">
-            <a:schemeClr val="accent1"/>
-          </a:fillRef>
-          <a:effectRef idx="0">
-            <a:schemeClr val="accent1"/>
-          </a:effectRef>
-          <a:fontRef idx="minor">
-            <a:schemeClr val="lt1"/>
-          </a:fontRef>
-        </p:style>
-        <p:txBody>
-          <a:bodyPr rtlCol="0" anchor="ctr"/>
-          <a:lstStyle/>
-          <a:p>
-            <a:pPr algn="ctr"/>
-            <a:endParaRPr lang="da-DK" sz="2800">
-              <a:solidFill>
-                <a:srgbClr val="FFFF00"/>
-              </a:solidFill>
-            </a:endParaRPr>
-          </a:p>
-        </p:txBody>
-      </p:sp>
     </p:spTree>
     <p:extLst>
       <p:ext uri="{BB962C8B-B14F-4D97-AF65-F5344CB8AC3E}">
-        <p14:creationId xmlns:p14="http://schemas.microsoft.com/office/powerpoint/2010/main" val="3537013757"/>
+        <p14:creationId xmlns:p14="http://schemas.microsoft.com/office/powerpoint/2010/main" val="1080016093"/>
       </p:ext>
     </p:extLst>
   </p:cSld>
@@ -3777,9 +3733,37 @@
             </a:r>
             <a:r>
               <a:rPr lang="en-US" sz="2000" b="1">
-                <a:latin typeface="Consolas" panose="020B0609020204030204" pitchFamily="49" charset="0"/>
-              </a:rPr>
-              <a:t>DbSet&lt;Car&gt; Cars { </a:t>
+                <a:solidFill>
+                  <a:schemeClr val="accent6">
+                    <a:lumMod val="75000"/>
+                  </a:schemeClr>
+                </a:solidFill>
+                <a:latin typeface="Consolas" panose="020B0609020204030204" pitchFamily="49" charset="0"/>
+              </a:rPr>
+              <a:t>DbSet</a:t>
+            </a:r>
+            <a:r>
+              <a:rPr lang="en-US" sz="2000" b="1">
+                <a:latin typeface="Consolas" panose="020B0609020204030204" pitchFamily="49" charset="0"/>
+              </a:rPr>
+              <a:t>&lt;</a:t>
+            </a:r>
+            <a:r>
+              <a:rPr lang="en-US" sz="2000" b="1">
+                <a:solidFill>
+                  <a:schemeClr val="accent6">
+                    <a:lumMod val="75000"/>
+                  </a:schemeClr>
+                </a:solidFill>
+                <a:latin typeface="Consolas" panose="020B0609020204030204" pitchFamily="49" charset="0"/>
+              </a:rPr>
+              <a:t>Car</a:t>
+            </a:r>
+            <a:r>
+              <a:rPr lang="en-US" sz="2000" b="1">
+                <a:latin typeface="Consolas" panose="020B0609020204030204" pitchFamily="49" charset="0"/>
+              </a:rPr>
+              <a:t>&gt; Cars { </a:t>
             </a:r>
             <a:r>
               <a:rPr lang="en-US" sz="2000" b="1">
@@ -3842,21 +3826,37 @@
             </a:r>
             <a:r>
               <a:rPr lang="en-US" sz="2000" b="1">
-                <a:latin typeface="Consolas" panose="020B0609020204030204" pitchFamily="49" charset="0"/>
-              </a:rPr>
-              <a:t>DbSet&lt;Customer&gt; </a:t>
+                <a:solidFill>
+                  <a:schemeClr val="accent6">
+                    <a:lumMod val="75000"/>
+                  </a:schemeClr>
+                </a:solidFill>
+                <a:latin typeface="Consolas" panose="020B0609020204030204" pitchFamily="49" charset="0"/>
+              </a:rPr>
+              <a:t>DbSet</a:t>
             </a:r>
             <a:r>
               <a:rPr lang="en-US" sz="2000" b="1">
                 <a:latin typeface="Consolas" panose="020B0609020204030204" pitchFamily="49" charset="0"/>
               </a:rPr>
-              <a:t>Customers </a:t>
+              <a:t>&lt;</a:t>
             </a:r>
             <a:r>
               <a:rPr lang="en-US" sz="2000" b="1">
-                <a:latin typeface="Consolas" panose="020B0609020204030204" pitchFamily="49" charset="0"/>
-              </a:rPr>
-              <a:t>{ </a:t>
+                <a:solidFill>
+                  <a:schemeClr val="accent6">
+                    <a:lumMod val="75000"/>
+                  </a:schemeClr>
+                </a:solidFill>
+                <a:latin typeface="Consolas" panose="020B0609020204030204" pitchFamily="49" charset="0"/>
+              </a:rPr>
+              <a:t>Customer</a:t>
+            </a:r>
+            <a:r>
+              <a:rPr lang="en-US" sz="2000" b="1">
+                <a:latin typeface="Consolas" panose="020B0609020204030204" pitchFamily="49" charset="0"/>
+              </a:rPr>
+              <a:t>&gt; Customers { </a:t>
             </a:r>
             <a:r>
               <a:rPr lang="en-US" sz="2000" b="1">
@@ -3929,16 +3929,7 @@
                 </a:solidFill>
                 <a:latin typeface="Consolas" panose="020B0609020204030204" pitchFamily="49" charset="0"/>
               </a:rPr>
-              <a:t>protected </a:t>
-            </a:r>
-            <a:r>
-              <a:rPr lang="en-US" sz="2000" b="1">
-                <a:solidFill>
-                  <a:srgbClr val="0070C0"/>
-                </a:solidFill>
-                <a:latin typeface="Consolas" panose="020B0609020204030204" pitchFamily="49" charset="0"/>
-              </a:rPr>
-              <a:t>override void</a:t>
+              <a:t>protected override void</a:t>
             </a:r>
             <a:r>
               <a:rPr lang="en-US" sz="2000" b="1">
@@ -3961,13 +3952,7 @@
               <a:rPr lang="en-US" sz="2000" b="1">
                 <a:latin typeface="Consolas" panose="020B0609020204030204" pitchFamily="49" charset="0"/>
               </a:rPr>
-              <a:t> </a:t>
-            </a:r>
-            <a:r>
-              <a:rPr lang="en-US" sz="2000" b="1">
-                <a:latin typeface="Consolas" panose="020B0609020204030204" pitchFamily="49" charset="0"/>
-              </a:rPr>
-              <a:t>modelBuilder</a:t>
+              <a:t> modelBuilder</a:t>
             </a:r>
             <a:r>
               <a:rPr lang="en-US" sz="2000" b="1" smtClean="0">
@@ -4079,11 +4064,11 @@
   <p:clrMapOvr>
     <a:masterClrMapping/>
   </p:clrMapOvr>
-  <mc:AlternateContent xmlns:mc="http://schemas.openxmlformats.org/markup-compatibility/2006">
-    <mc:Choice xmlns:p14="http://schemas.microsoft.com/office/powerpoint/2010/main" Requires="p14">
+  <mc:AlternateContent xmlns:mc="http://schemas.openxmlformats.org/markup-compatibility/2006" xmlns:p14="http://schemas.microsoft.com/office/powerpoint/2010/main">
+    <mc:Choice Requires="p14">
       <p:transition p14:dur="0"/>
     </mc:Choice>
-    <mc:Fallback>
+    <mc:Fallback xmlns="">
       <p:transition/>
     </mc:Fallback>
   </mc:AlternateContent>
@@ -4191,7 +4176,24 @@
               <a:rPr lang="en-US" b="1">
                 <a:latin typeface="Consolas" panose="020B0609020204030204" pitchFamily="49" charset="0"/>
               </a:rPr>
-              <a:t> CarRetailDBContext())</a:t>
+              <a:t> </a:t>
+            </a:r>
+            <a:r>
+              <a:rPr lang="en-US" b="1">
+                <a:solidFill>
+                  <a:schemeClr val="accent6">
+                    <a:lumMod val="75000"/>
+                  </a:schemeClr>
+                </a:solidFill>
+                <a:latin typeface="Consolas" panose="020B0609020204030204" pitchFamily="49" charset="0"/>
+              </a:rPr>
+              <a:t>CarRetailDBContext</a:t>
+            </a:r>
+            <a:r>
+              <a:rPr lang="en-US" b="1">
+                <a:latin typeface="Consolas" panose="020B0609020204030204" pitchFamily="49" charset="0"/>
+              </a:rPr>
+              <a:t>())</a:t>
             </a:r>
             <a:endParaRPr lang="da-DK" b="1">
               <a:latin typeface="Consolas" panose="020B0609020204030204" pitchFamily="49" charset="0"/>
@@ -4251,16 +4253,7 @@
                 </a:solidFill>
                 <a:latin typeface="Consolas" panose="020B0609020204030204" pitchFamily="49" charset="0"/>
               </a:rPr>
-              <a:t>"</a:t>
-            </a:r>
-            <a:r>
-              <a:rPr lang="en-US" b="1">
-                <a:solidFill>
-                  <a:srgbClr val="C00000"/>
-                </a:solidFill>
-                <a:latin typeface="Consolas" panose="020B0609020204030204" pitchFamily="49" charset="0"/>
-              </a:rPr>
-              <a:t>All </a:t>
+              <a:t>"All </a:t>
             </a:r>
             <a:r>
               <a:rPr lang="en-US" b="1" smtClean="0">
@@ -4491,11 +4484,11 @@
   <p:clrMapOvr>
     <a:masterClrMapping/>
   </p:clrMapOvr>
-  <mc:AlternateContent xmlns:mc="http://schemas.openxmlformats.org/markup-compatibility/2006">
-    <mc:Choice xmlns:p14="http://schemas.microsoft.com/office/powerpoint/2010/main" Requires="p14">
+  <mc:AlternateContent xmlns:mc="http://schemas.openxmlformats.org/markup-compatibility/2006" xmlns:p14="http://schemas.microsoft.com/office/powerpoint/2010/main">
+    <mc:Choice Requires="p14">
       <p:transition p14:dur="0"/>
     </mc:Choice>
-    <mc:Fallback>
+    <mc:Fallback xmlns="">
       <p:transition/>
     </mc:Fallback>
   </mc:AlternateContent>
@@ -4595,27 +4588,35 @@
             </a:r>
             <a:r>
               <a:rPr lang="en-US" b="1">
-                <a:latin typeface="Consolas" panose="020B0609020204030204" pitchFamily="49" charset="0"/>
-              </a:rPr>
-              <a:t>Car(4, </a:t>
+                <a:solidFill>
+                  <a:schemeClr val="accent6">
+                    <a:lumMod val="75000"/>
+                  </a:schemeClr>
+                </a:solidFill>
+                <a:latin typeface="Consolas" panose="020B0609020204030204" pitchFamily="49" charset="0"/>
+              </a:rPr>
+              <a:t>Car</a:t>
+            </a:r>
+            <a:r>
+              <a:rPr lang="en-US" b="1" smtClean="0">
+                <a:latin typeface="Consolas" panose="020B0609020204030204" pitchFamily="49" charset="0"/>
+              </a:rPr>
+              <a:t>(4</a:t>
             </a:r>
             <a:r>
               <a:rPr lang="en-US" b="1">
+                <a:latin typeface="Consolas" panose="020B0609020204030204" pitchFamily="49" charset="0"/>
+              </a:rPr>
+              <a:t>, </a:t>
+            </a:r>
+            <a:r>
+              <a:rPr lang="en-US" b="1">
                 <a:solidFill>
                   <a:srgbClr val="C00000"/>
                 </a:solidFill>
                 <a:latin typeface="Consolas" panose="020B0609020204030204" pitchFamily="49" charset="0"/>
               </a:rPr>
-              <a:t>"MN 1234</a:t>
-            </a:r>
-            <a:r>
-              <a:rPr lang="en-US" b="1">
-                <a:solidFill>
-                  <a:srgbClr val="C00000"/>
-                </a:solidFill>
-                <a:latin typeface="Consolas" panose="020B0609020204030204" pitchFamily="49" charset="0"/>
-              </a:rPr>
-              <a:t>"</a:t>
+              <a:t>"MN 1234"</a:t>
             </a:r>
             <a:r>
               <a:rPr lang="en-US" b="1">
@@ -4754,27 +4755,35 @@
             </a:r>
             <a:r>
               <a:rPr lang="en-US" b="1">
-                <a:latin typeface="Consolas" panose="020B0609020204030204" pitchFamily="49" charset="0"/>
-              </a:rPr>
-              <a:t>Car(5, </a:t>
+                <a:solidFill>
+                  <a:schemeClr val="accent6">
+                    <a:lumMod val="75000"/>
+                  </a:schemeClr>
+                </a:solidFill>
+                <a:latin typeface="Consolas" panose="020B0609020204030204" pitchFamily="49" charset="0"/>
+              </a:rPr>
+              <a:t>Car</a:t>
+            </a:r>
+            <a:r>
+              <a:rPr lang="en-US" b="1" smtClean="0">
+                <a:latin typeface="Consolas" panose="020B0609020204030204" pitchFamily="49" charset="0"/>
+              </a:rPr>
+              <a:t>(5</a:t>
             </a:r>
             <a:r>
               <a:rPr lang="en-US" b="1">
+                <a:latin typeface="Consolas" panose="020B0609020204030204" pitchFamily="49" charset="0"/>
+              </a:rPr>
+              <a:t>, </a:t>
+            </a:r>
+            <a:r>
+              <a:rPr lang="en-US" b="1">
                 <a:solidFill>
                   <a:srgbClr val="C00000"/>
                 </a:solidFill>
                 <a:latin typeface="Consolas" panose="020B0609020204030204" pitchFamily="49" charset="0"/>
               </a:rPr>
-              <a:t>"QR 3456</a:t>
-            </a:r>
-            <a:r>
-              <a:rPr lang="en-US" b="1">
-                <a:solidFill>
-                  <a:srgbClr val="C00000"/>
-                </a:solidFill>
-                <a:latin typeface="Consolas" panose="020B0609020204030204" pitchFamily="49" charset="0"/>
-              </a:rPr>
-              <a:t>"</a:t>
+              <a:t>"QR 3456"</a:t>
             </a:r>
             <a:r>
               <a:rPr lang="en-US" b="1">
@@ -4839,13 +4848,7 @@
               <a:rPr lang="en-US" b="1">
                 <a:latin typeface="Consolas" panose="020B0609020204030204" pitchFamily="49" charset="0"/>
               </a:rPr>
-              <a:t>, </a:t>
-            </a:r>
-            <a:r>
-              <a:rPr lang="en-US" b="1">
-                <a:latin typeface="Consolas" panose="020B0609020204030204" pitchFamily="49" charset="0"/>
-              </a:rPr>
-              <a:t>2009</a:t>
+              <a:t>, 2009</a:t>
             </a:r>
             <a:r>
               <a:rPr lang="en-US" b="1" smtClean="0">
@@ -5550,37 +5553,7 @@
               </a:rPr>
               <a:t>queryResult =	</a:t>
             </a:r>
-            <a:r>
-              <a:rPr lang="en-US" b="1">
-                <a:solidFill>
-                  <a:srgbClr val="0070C0"/>
-                </a:solidFill>
-                <a:latin typeface="Consolas" panose="020B0609020204030204" pitchFamily="49" charset="0"/>
-              </a:rPr>
-              <a:t>from</a:t>
-            </a:r>
-            <a:r>
-              <a:rPr lang="en-US" b="1">
-                <a:latin typeface="Consolas" panose="020B0609020204030204" pitchFamily="49" charset="0"/>
-              </a:rPr>
-              <a:t> c </a:t>
-            </a:r>
-            <a:r>
-              <a:rPr lang="en-US" b="1">
-                <a:solidFill>
-                  <a:srgbClr val="0070C0"/>
-                </a:solidFill>
-                <a:latin typeface="Consolas" panose="020B0609020204030204" pitchFamily="49" charset="0"/>
-              </a:rPr>
-              <a:t>in</a:t>
-            </a:r>
-            <a:r>
-              <a:rPr lang="en-US" b="1">
-                <a:latin typeface="Consolas" panose="020B0609020204030204" pitchFamily="49" charset="0"/>
-              </a:rPr>
-              <a:t> db.Cars</a:t>
-            </a:r>
-            <a:endParaRPr lang="da-DK" b="1">
+            <a:endParaRPr lang="en-US" b="1" smtClean="0">
               <a:latin typeface="Consolas" panose="020B0609020204030204" pitchFamily="49" charset="0"/>
             </a:endParaRPr>
           </a:p>
@@ -5598,13 +5571,75 @@
                 </a:solidFill>
                 <a:latin typeface="Consolas" panose="020B0609020204030204" pitchFamily="49" charset="0"/>
               </a:rPr>
-              <a:t>where</a:t>
+              <a:t>	</a:t>
+            </a:r>
+            <a:r>
+              <a:rPr lang="en-US" b="1" smtClean="0">
+                <a:solidFill>
+                  <a:srgbClr val="0070C0"/>
+                </a:solidFill>
+                <a:latin typeface="Consolas" panose="020B0609020204030204" pitchFamily="49" charset="0"/>
+              </a:rPr>
+              <a:t>from</a:t>
+            </a:r>
+            <a:r>
+              <a:rPr lang="en-US" b="1" smtClean="0">
+                <a:latin typeface="Consolas" panose="020B0609020204030204" pitchFamily="49" charset="0"/>
+              </a:rPr>
+              <a:t> </a:t>
             </a:r>
             <a:r>
               <a:rPr lang="en-US" b="1">
                 <a:latin typeface="Consolas" panose="020B0609020204030204" pitchFamily="49" charset="0"/>
               </a:rPr>
-              <a:t> c.Price &gt; 70000 &amp;&amp; c.Brand == </a:t>
+              <a:t>c </a:t>
+            </a:r>
+            <a:r>
+              <a:rPr lang="en-US" b="1">
+                <a:solidFill>
+                  <a:srgbClr val="0070C0"/>
+                </a:solidFill>
+                <a:latin typeface="Consolas" panose="020B0609020204030204" pitchFamily="49" charset="0"/>
+              </a:rPr>
+              <a:t>in</a:t>
+            </a:r>
+            <a:r>
+              <a:rPr lang="en-US" b="1">
+                <a:latin typeface="Consolas" panose="020B0609020204030204" pitchFamily="49" charset="0"/>
+              </a:rPr>
+              <a:t> db.Cars</a:t>
+            </a:r>
+            <a:endParaRPr lang="da-DK" b="1">
+              <a:latin typeface="Consolas" panose="020B0609020204030204" pitchFamily="49" charset="0"/>
+            </a:endParaRPr>
+          </a:p>
+          <a:p>
+            <a:pPr marL="0" indent="0">
+              <a:spcBef>
+                <a:spcPts val="0"/>
+              </a:spcBef>
+              <a:buNone/>
+            </a:pPr>
+            <a:r>
+              <a:rPr lang="en-US" b="1" smtClean="0">
+                <a:solidFill>
+                  <a:srgbClr val="0070C0"/>
+                </a:solidFill>
+                <a:latin typeface="Consolas" panose="020B0609020204030204" pitchFamily="49" charset="0"/>
+              </a:rPr>
+              <a:t>	where</a:t>
+            </a:r>
+            <a:r>
+              <a:rPr lang="en-US" b="1" smtClean="0">
+                <a:latin typeface="Consolas" panose="020B0609020204030204" pitchFamily="49" charset="0"/>
+              </a:rPr>
+              <a:t> </a:t>
+            </a:r>
+            <a:r>
+              <a:rPr lang="en-US" b="1">
+                <a:latin typeface="Consolas" panose="020B0609020204030204" pitchFamily="49" charset="0"/>
+              </a:rPr>
+              <a:t>c.Price &gt; 70000 &amp;&amp; c.Brand == </a:t>
             </a:r>
             <a:r>
               <a:rPr lang="en-US" b="1">
@@ -5630,13 +5665,22 @@
               <a:buNone/>
             </a:pPr>
             <a:r>
+              <a:rPr lang="en-US" b="1" smtClean="0">
+                <a:solidFill>
+                  <a:srgbClr val="0070C0"/>
+                </a:solidFill>
+                <a:latin typeface="Consolas" panose="020B0609020204030204" pitchFamily="49" charset="0"/>
+              </a:rPr>
+              <a:t>	select </a:t>
+            </a:r>
+            <a:r>
               <a:rPr lang="en-US" b="1">
                 <a:solidFill>
                   <a:srgbClr val="0070C0"/>
                 </a:solidFill>
                 <a:latin typeface="Consolas" panose="020B0609020204030204" pitchFamily="49" charset="0"/>
               </a:rPr>
-              <a:t>select new </a:t>
+              <a:t>new </a:t>
             </a:r>
             <a:r>
               <a:rPr lang="en-US" b="1">
@@ -5953,7 +5997,6 @@
               <a:rPr lang="da-DK" sz="3600" smtClean="0"/>
               <a:t>Data source</a:t>
             </a:r>
-            <a:endParaRPr lang="da-DK" sz="3600" smtClean="0"/>
           </a:p>
         </p:txBody>
       </p:sp>
@@ -7134,11 +7177,11 @@
   <p:clrMapOvr>
     <a:masterClrMapping/>
   </p:clrMapOvr>
-  <mc:AlternateContent xmlns:mc="http://schemas.openxmlformats.org/markup-compatibility/2006">
-    <mc:Choice xmlns:p14="http://schemas.microsoft.com/office/powerpoint/2010/main" Requires="p14">
+  <mc:AlternateContent xmlns:mc="http://schemas.openxmlformats.org/markup-compatibility/2006" xmlns:p14="http://schemas.microsoft.com/office/powerpoint/2010/main">
+    <mc:Choice Requires="p14">
       <p:transition p14:dur="0"/>
     </mc:Choice>
-    <mc:Fallback>
+    <mc:Fallback xmlns="">
       <p:transition/>
     </mc:Fallback>
   </mc:AlternateContent>
@@ -7546,11 +7589,11 @@
   <p:clrMapOvr>
     <a:masterClrMapping/>
   </p:clrMapOvr>
-  <mc:AlternateContent xmlns:mc="http://schemas.openxmlformats.org/markup-compatibility/2006">
-    <mc:Choice xmlns:p14="http://schemas.microsoft.com/office/powerpoint/2010/main" Requires="p14">
+  <mc:AlternateContent xmlns:mc="http://schemas.openxmlformats.org/markup-compatibility/2006" xmlns:p14="http://schemas.microsoft.com/office/powerpoint/2010/main">
+    <mc:Choice Requires="p14">
       <p:transition p14:dur="0"/>
     </mc:Choice>
-    <mc:Fallback>
+    <mc:Fallback xmlns="">
       <p:transition/>
     </mc:Fallback>
   </mc:AlternateContent>
@@ -7836,7 +7879,6 @@
               <a:rPr lang="da-DK" sz="3600" smtClean="0"/>
               <a:t>Database</a:t>
             </a:r>
-            <a:endParaRPr lang="da-DK" sz="3600" smtClean="0"/>
           </a:p>
         </p:txBody>
       </p:sp>
@@ -7900,13 +7942,13 @@
   <p:clrMapOvr>
     <a:masterClrMapping/>
   </p:clrMapOvr>
-  <mc:AlternateContent xmlns:mc="http://schemas.openxmlformats.org/markup-compatibility/2006">
-    <mc:Choice xmlns:p14="http://schemas.microsoft.com/office/powerpoint/2010/main" Requires="p14">
+  <mc:AlternateContent xmlns:mc="http://schemas.openxmlformats.org/markup-compatibility/2006" xmlns:p14="http://schemas.microsoft.com/office/powerpoint/2010/main">
+    <mc:Choice Requires="p14">
       <p:transition spd="med" p14:dur="700">
         <p:fade/>
       </p:transition>
     </mc:Choice>
-    <mc:Fallback>
+    <mc:Fallback xmlns="">
       <p:transition spd="med">
         <p:fade/>
       </p:transition>
@@ -8148,7 +8190,6 @@
               <a:rPr lang="da-DK" sz="3600" smtClean="0"/>
               <a:t>Database</a:t>
             </a:r>
-            <a:endParaRPr lang="da-DK" sz="3600" smtClean="0"/>
           </a:p>
         </p:txBody>
       </p:sp>
@@ -8162,13 +8203,13 @@
   <p:clrMapOvr>
     <a:masterClrMapping/>
   </p:clrMapOvr>
-  <mc:AlternateContent xmlns:mc="http://schemas.openxmlformats.org/markup-compatibility/2006">
-    <mc:Choice xmlns:p14="http://schemas.microsoft.com/office/powerpoint/2010/main" Requires="p14">
+  <mc:AlternateContent xmlns:mc="http://schemas.openxmlformats.org/markup-compatibility/2006" xmlns:p14="http://schemas.microsoft.com/office/powerpoint/2010/main">
+    <mc:Choice Requires="p14">
       <p:transition spd="med" p14:dur="700">
         <p:fade/>
       </p:transition>
     </mc:Choice>
-    <mc:Fallback>
+    <mc:Fallback xmlns="">
       <p:transition spd="med">
         <p:fade/>
       </p:transition>
@@ -8444,7 +8485,6 @@
               <a:rPr lang="da-DK" sz="4800" smtClean="0"/>
               <a:t>Database</a:t>
             </a:r>
-            <a:endParaRPr lang="da-DK" sz="4800" smtClean="0"/>
           </a:p>
         </p:txBody>
       </p:sp>

</xml_diff>